<commit_message>
added section on obstacle avoidance to poster
</commit_message>
<xml_diff>
--- a/docs/Poster/postertemplate.pptx
+++ b/docs/Poster/postertemplate.pptx
@@ -238,7 +238,7 @@
           <a:p>
             <a:fld id="{7395F848-6DDA-9042-95D4-0071278BB24B}" type="datetimeFigureOut">
               <a:rPr lang="en-US" smtClean="0"/>
-              <a:t>3/16/2017</a:t>
+              <a:t>3/17/2017</a:t>
             </a:fld>
             <a:endParaRPr lang="en-US"/>
           </a:p>
@@ -1386,7 +1386,7 @@
           <a:p>
             <a:fld id="{56B6BD69-149A-CD41-9E7C-E241C9398BA0}" type="datetimeFigureOut">
               <a:rPr lang="en-US" smtClean="0"/>
-              <a:t>3/16/2017</a:t>
+              <a:t>3/17/2017</a:t>
             </a:fld>
             <a:endParaRPr lang="en-US"/>
           </a:p>
@@ -1564,7 +1564,7 @@
           <a:p>
             <a:fld id="{56B6BD69-149A-CD41-9E7C-E241C9398BA0}" type="datetimeFigureOut">
               <a:rPr lang="en-US" smtClean="0"/>
-              <a:t>3/16/2017</a:t>
+              <a:t>3/17/2017</a:t>
             </a:fld>
             <a:endParaRPr lang="en-US"/>
           </a:p>
@@ -1732,7 +1732,7 @@
           <a:p>
             <a:fld id="{56B6BD69-149A-CD41-9E7C-E241C9398BA0}" type="datetimeFigureOut">
               <a:rPr lang="en-US" smtClean="0"/>
-              <a:t>3/16/2017</a:t>
+              <a:t>3/17/2017</a:t>
             </a:fld>
             <a:endParaRPr lang="en-US"/>
           </a:p>
@@ -1977,7 +1977,7 @@
           <a:p>
             <a:fld id="{56B6BD69-149A-CD41-9E7C-E241C9398BA0}" type="datetimeFigureOut">
               <a:rPr lang="en-US" smtClean="0"/>
-              <a:t>3/16/2017</a:t>
+              <a:t>3/17/2017</a:t>
             </a:fld>
             <a:endParaRPr lang="en-US"/>
           </a:p>
@@ -2262,7 +2262,7 @@
           <a:p>
             <a:fld id="{56B6BD69-149A-CD41-9E7C-E241C9398BA0}" type="datetimeFigureOut">
               <a:rPr lang="en-US" smtClean="0"/>
-              <a:t>3/16/2017</a:t>
+              <a:t>3/17/2017</a:t>
             </a:fld>
             <a:endParaRPr lang="en-US"/>
           </a:p>
@@ -2686,7 +2686,7 @@
           <a:p>
             <a:fld id="{56B6BD69-149A-CD41-9E7C-E241C9398BA0}" type="datetimeFigureOut">
               <a:rPr lang="en-US" smtClean="0"/>
-              <a:t>3/16/2017</a:t>
+              <a:t>3/17/2017</a:t>
             </a:fld>
             <a:endParaRPr lang="en-US"/>
           </a:p>
@@ -2803,7 +2803,7 @@
           <a:p>
             <a:fld id="{56B6BD69-149A-CD41-9E7C-E241C9398BA0}" type="datetimeFigureOut">
               <a:rPr lang="en-US" smtClean="0"/>
-              <a:t>3/16/2017</a:t>
+              <a:t>3/17/2017</a:t>
             </a:fld>
             <a:endParaRPr lang="en-US"/>
           </a:p>
@@ -2898,7 +2898,7 @@
           <a:p>
             <a:fld id="{56B6BD69-149A-CD41-9E7C-E241C9398BA0}" type="datetimeFigureOut">
               <a:rPr lang="en-US" smtClean="0"/>
-              <a:t>3/16/2017</a:t>
+              <a:t>3/17/2017</a:t>
             </a:fld>
             <a:endParaRPr lang="en-US"/>
           </a:p>
@@ -3173,7 +3173,7 @@
           <a:p>
             <a:fld id="{56B6BD69-149A-CD41-9E7C-E241C9398BA0}" type="datetimeFigureOut">
               <a:rPr lang="en-US" smtClean="0"/>
-              <a:t>3/16/2017</a:t>
+              <a:t>3/17/2017</a:t>
             </a:fld>
             <a:endParaRPr lang="en-US"/>
           </a:p>
@@ -3428,7 +3428,7 @@
           <a:p>
             <a:fld id="{56B6BD69-149A-CD41-9E7C-E241C9398BA0}" type="datetimeFigureOut">
               <a:rPr lang="en-US" smtClean="0"/>
-              <a:t>3/16/2017</a:t>
+              <a:t>3/17/2017</a:t>
             </a:fld>
             <a:endParaRPr lang="en-US"/>
           </a:p>
@@ -3640,7 +3640,7 @@
           <a:p>
             <a:fld id="{56B6BD69-149A-CD41-9E7C-E241C9398BA0}" type="datetimeFigureOut">
               <a:rPr lang="en-US" smtClean="0"/>
-              <a:t>3/16/2017</a:t>
+              <a:t>3/17/2017</a:t>
             </a:fld>
             <a:endParaRPr lang="en-US"/>
           </a:p>
@@ -4151,381 +4151,14 @@
               </a:spcAft>
             </a:pPr>
             <a:r>
-              <a:rPr lang="en-US" sz="3000" dirty="0" err="1"/>
-              <a:t>Vivamus</a:t>
-            </a:r>
-            <a:r>
-              <a:rPr lang="en-US" sz="3000" dirty="0"/>
-              <a:t> </a:t>
-            </a:r>
-            <a:r>
-              <a:rPr lang="en-US" sz="3000" dirty="0" err="1"/>
-              <a:t>interdum</a:t>
-            </a:r>
-            <a:r>
-              <a:rPr lang="en-US" sz="3000" dirty="0"/>
-              <a:t> magna </a:t>
-            </a:r>
-            <a:r>
-              <a:rPr lang="en-US" sz="3000" dirty="0" err="1"/>
-              <a:t>quis</a:t>
-            </a:r>
-            <a:r>
-              <a:rPr lang="en-US" sz="3000" dirty="0"/>
-              <a:t> </a:t>
-            </a:r>
-            <a:r>
-              <a:rPr lang="en-US" sz="3000" dirty="0" err="1"/>
-              <a:t>mauris</a:t>
-            </a:r>
-            <a:r>
-              <a:rPr lang="en-US" sz="3000" dirty="0"/>
-              <a:t> </a:t>
-            </a:r>
-            <a:r>
-              <a:rPr lang="en-US" sz="3000" dirty="0" err="1"/>
-              <a:t>facilisis</a:t>
-            </a:r>
-            <a:r>
-              <a:rPr lang="en-US" sz="3000" dirty="0"/>
-              <a:t> </a:t>
-            </a:r>
-            <a:r>
-              <a:rPr lang="en-US" sz="3000" dirty="0" err="1"/>
-              <a:t>ornare</a:t>
-            </a:r>
-            <a:r>
-              <a:rPr lang="en-US" sz="3000" dirty="0"/>
-              <a:t>. </a:t>
-            </a:r>
-            <a:r>
-              <a:rPr lang="en-US" sz="3000" dirty="0" err="1"/>
-              <a:t>Nunc</a:t>
-            </a:r>
-            <a:r>
-              <a:rPr lang="en-US" sz="3000" dirty="0"/>
-              <a:t> </a:t>
-            </a:r>
-            <a:r>
-              <a:rPr lang="en-US" sz="3000" dirty="0" err="1"/>
-              <a:t>eget</a:t>
-            </a:r>
-            <a:r>
-              <a:rPr lang="en-US" sz="3000" dirty="0"/>
-              <a:t> </a:t>
-            </a:r>
-            <a:r>
-              <a:rPr lang="en-US" sz="3000" dirty="0" err="1"/>
-              <a:t>lectus</a:t>
-            </a:r>
-            <a:r>
-              <a:rPr lang="en-US" sz="3000" dirty="0"/>
-              <a:t> </a:t>
-            </a:r>
-            <a:r>
-              <a:rPr lang="en-US" sz="3000" dirty="0" err="1"/>
-              <a:t>massa</a:t>
-            </a:r>
-            <a:r>
-              <a:rPr lang="en-US" sz="3000" dirty="0"/>
-              <a:t>, </a:t>
-            </a:r>
-            <a:r>
-              <a:rPr lang="en-US" sz="3000" dirty="0" err="1"/>
-              <a:t>quis</a:t>
-            </a:r>
-            <a:r>
-              <a:rPr lang="en-US" sz="3000" dirty="0"/>
-              <a:t> </a:t>
-            </a:r>
-            <a:r>
-              <a:rPr lang="en-US" sz="3000" dirty="0" err="1"/>
-              <a:t>ullamcorper</a:t>
-            </a:r>
-            <a:r>
-              <a:rPr lang="en-US" sz="3000" dirty="0"/>
-              <a:t> </a:t>
-            </a:r>
-            <a:r>
-              <a:rPr lang="en-US" sz="3000" dirty="0" err="1"/>
-              <a:t>libero</a:t>
-            </a:r>
-            <a:r>
-              <a:rPr lang="en-US" sz="3000" dirty="0"/>
-              <a:t>. </a:t>
-            </a:r>
-            <a:r>
-              <a:rPr lang="en-US" sz="3000" dirty="0" err="1"/>
-              <a:t>Pellentesque</a:t>
-            </a:r>
-            <a:r>
-              <a:rPr lang="en-US" sz="3000" dirty="0"/>
-              <a:t> habitant </a:t>
-            </a:r>
-            <a:r>
-              <a:rPr lang="en-US" sz="3000" dirty="0" err="1"/>
-              <a:t>morbi</a:t>
-            </a:r>
-            <a:r>
-              <a:rPr lang="en-US" sz="3000" dirty="0"/>
-              <a:t> </a:t>
-            </a:r>
-            <a:r>
-              <a:rPr lang="en-US" sz="3000" dirty="0" err="1"/>
-              <a:t>tristique</a:t>
-            </a:r>
-            <a:r>
-              <a:rPr lang="en-US" sz="3000" dirty="0"/>
-              <a:t> </a:t>
-            </a:r>
-            <a:r>
-              <a:rPr lang="en-US" sz="3000" dirty="0" err="1"/>
-              <a:t>senectus</a:t>
-            </a:r>
-            <a:r>
-              <a:rPr lang="en-US" sz="3000" dirty="0"/>
-              <a:t> et </a:t>
-            </a:r>
-            <a:r>
-              <a:rPr lang="en-US" sz="3000" dirty="0" err="1"/>
-              <a:t>netus</a:t>
-            </a:r>
-            <a:r>
-              <a:rPr lang="en-US" sz="3000" dirty="0"/>
-              <a:t> et </a:t>
-            </a:r>
-            <a:r>
-              <a:rPr lang="en-US" sz="3000" dirty="0" err="1"/>
-              <a:t>malesuada</a:t>
-            </a:r>
-            <a:r>
-              <a:rPr lang="en-US" sz="3000" dirty="0"/>
-              <a:t> fames ac </a:t>
-            </a:r>
-            <a:r>
-              <a:rPr lang="en-US" sz="3000" dirty="0" err="1"/>
-              <a:t>turpis</a:t>
-            </a:r>
-            <a:r>
-              <a:rPr lang="en-US" sz="3000" dirty="0"/>
-              <a:t> </a:t>
-            </a:r>
-            <a:r>
-              <a:rPr lang="en-US" sz="3000" dirty="0" err="1"/>
-              <a:t>egestas</a:t>
-            </a:r>
-            <a:r>
-              <a:rPr lang="en-US" sz="3000" dirty="0"/>
-              <a:t>. </a:t>
-            </a:r>
-            <a:r>
-              <a:rPr lang="en-US" sz="3000" dirty="0" err="1"/>
-              <a:t>Praesent</a:t>
-            </a:r>
-            <a:r>
-              <a:rPr lang="en-US" sz="3000" dirty="0"/>
-              <a:t> </a:t>
-            </a:r>
-            <a:r>
-              <a:rPr lang="en-US" sz="3000" dirty="0" err="1"/>
-              <a:t>volutpat</a:t>
-            </a:r>
-            <a:r>
-              <a:rPr lang="en-US" sz="3000" dirty="0"/>
-              <a:t> ipsum </a:t>
-            </a:r>
-            <a:r>
-              <a:rPr lang="en-US" sz="3000" dirty="0" err="1"/>
-              <a:t>eu</a:t>
-            </a:r>
-            <a:r>
-              <a:rPr lang="en-US" sz="3000" dirty="0"/>
-              <a:t> </a:t>
-            </a:r>
-            <a:r>
-              <a:rPr lang="en-US" sz="3000" dirty="0" err="1"/>
-              <a:t>justo</a:t>
-            </a:r>
-            <a:r>
-              <a:rPr lang="en-US" sz="3000" dirty="0"/>
-              <a:t> </a:t>
-            </a:r>
-            <a:r>
-              <a:rPr lang="en-US" sz="3000" dirty="0" err="1"/>
-              <a:t>aliquamleo</a:t>
-            </a:r>
-            <a:r>
-              <a:rPr lang="en-US" sz="3000" dirty="0"/>
-              <a:t>, </a:t>
-            </a:r>
-            <a:r>
-              <a:rPr lang="en-US" sz="3000" dirty="0" err="1"/>
-              <a:t>vel</a:t>
-            </a:r>
-            <a:r>
-              <a:rPr lang="en-US" sz="3000" dirty="0"/>
-              <a:t> cursus </a:t>
-            </a:r>
-            <a:r>
-              <a:rPr lang="en-US" sz="3000" dirty="0" err="1"/>
-              <a:t>nulla</a:t>
-            </a:r>
-            <a:r>
-              <a:rPr lang="en-US" sz="3000" dirty="0"/>
-              <a:t>. </a:t>
-            </a:r>
-            <a:r>
-              <a:rPr lang="en-US" sz="3000" dirty="0" err="1"/>
-              <a:t>Nullam</a:t>
-            </a:r>
-            <a:r>
-              <a:rPr lang="en-US" sz="3000" dirty="0"/>
-              <a:t> </a:t>
-            </a:r>
-            <a:r>
-              <a:rPr lang="en-US" sz="3000" dirty="0" err="1"/>
-              <a:t>tristique</a:t>
-            </a:r>
-            <a:r>
-              <a:rPr lang="en-US" sz="3000" dirty="0"/>
-              <a:t> </a:t>
-            </a:r>
-            <a:r>
-              <a:rPr lang="en-US" sz="3000" dirty="0" err="1"/>
-              <a:t>laoreet</a:t>
-            </a:r>
-            <a:r>
-              <a:rPr lang="en-US" sz="3000" dirty="0"/>
-              <a:t> </a:t>
-            </a:r>
-            <a:r>
-              <a:rPr lang="en-US" sz="3000" dirty="0" err="1"/>
-              <a:t>diam</a:t>
-            </a:r>
-            <a:r>
-              <a:rPr lang="en-US" sz="3000" dirty="0"/>
-              <a:t> a </a:t>
-            </a:r>
-            <a:r>
-              <a:rPr lang="en-US" sz="3000" dirty="0" err="1"/>
-              <a:t>consequat</a:t>
-            </a:r>
-            <a:r>
-              <a:rPr lang="en-US" sz="3000" dirty="0"/>
-              <a:t>. </a:t>
-            </a:r>
-            <a:r>
-              <a:rPr lang="en-US" sz="3000" dirty="0" err="1"/>
-              <a:t>Sed</a:t>
-            </a:r>
-            <a:r>
-              <a:rPr lang="en-US" sz="3000" dirty="0"/>
-              <a:t> </a:t>
-            </a:r>
-            <a:r>
-              <a:rPr lang="en-US" sz="3000" dirty="0" err="1"/>
-              <a:t>condimentum</a:t>
-            </a:r>
-            <a:r>
-              <a:rPr lang="en-US" sz="3000" dirty="0"/>
-              <a:t> convallis </a:t>
-            </a:r>
-            <a:r>
-              <a:rPr lang="en-US" sz="3000" dirty="0" err="1"/>
-              <a:t>orci</a:t>
-            </a:r>
-            <a:r>
-              <a:rPr lang="en-US" sz="3000" dirty="0"/>
-              <a:t>, </a:t>
-            </a:r>
-            <a:r>
-              <a:rPr lang="en-US" sz="3000" dirty="0" err="1"/>
-              <a:t>eu</a:t>
-            </a:r>
-            <a:r>
-              <a:rPr lang="en-US" sz="3000" dirty="0"/>
-              <a:t> </a:t>
-            </a:r>
-            <a:r>
-              <a:rPr lang="en-US" sz="3000" dirty="0" err="1"/>
-              <a:t>dignissim</a:t>
-            </a:r>
-            <a:r>
-              <a:rPr lang="en-US" sz="3000" dirty="0"/>
-              <a:t> ante </a:t>
-            </a:r>
-            <a:r>
-              <a:rPr lang="en-US" sz="3000" dirty="0" err="1"/>
-              <a:t>elementum</a:t>
-            </a:r>
-            <a:r>
-              <a:rPr lang="en-US" sz="3000" dirty="0"/>
-              <a:t> ac. </a:t>
-            </a:r>
-            <a:r>
-              <a:rPr lang="en-US" sz="3000" dirty="0" err="1"/>
-              <a:t>Donec</a:t>
-            </a:r>
-            <a:r>
-              <a:rPr lang="en-US" sz="3000" dirty="0"/>
-              <a:t> </a:t>
-            </a:r>
-            <a:r>
-              <a:rPr lang="en-US" sz="3000" dirty="0" err="1"/>
-              <a:t>quam</a:t>
-            </a:r>
-            <a:r>
-              <a:rPr lang="en-US" sz="3000" dirty="0"/>
-              <a:t> </a:t>
-            </a:r>
-            <a:r>
-              <a:rPr lang="en-US" sz="3000" dirty="0" err="1"/>
-              <a:t>tellus</a:t>
-            </a:r>
-            <a:r>
-              <a:rPr lang="en-US" sz="3000" dirty="0"/>
-              <a:t>, </a:t>
-            </a:r>
-            <a:r>
-              <a:rPr lang="en-US" sz="3000" dirty="0" err="1"/>
-              <a:t>fringilla</a:t>
-            </a:r>
-            <a:r>
-              <a:rPr lang="en-US" sz="3000" dirty="0"/>
-              <a:t> </a:t>
-            </a:r>
-            <a:r>
-              <a:rPr lang="en-US" sz="3000" dirty="0" err="1"/>
-              <a:t>vel</a:t>
-            </a:r>
-            <a:r>
-              <a:rPr lang="en-US" sz="3000" dirty="0"/>
-              <a:t> gravida sit </a:t>
-            </a:r>
-            <a:r>
-              <a:rPr lang="en-US" sz="3000" dirty="0" err="1"/>
-              <a:t>amet</a:t>
-            </a:r>
-            <a:r>
-              <a:rPr lang="en-US" sz="3000" dirty="0"/>
-              <a:t>, </a:t>
-            </a:r>
-            <a:r>
-              <a:rPr lang="en-US" sz="3000" dirty="0" err="1"/>
-              <a:t>egestas</a:t>
-            </a:r>
-            <a:r>
-              <a:rPr lang="en-US" sz="3000" dirty="0"/>
-              <a:t> id </a:t>
-            </a:r>
-            <a:r>
-              <a:rPr lang="en-US" sz="3000" dirty="0" err="1"/>
-              <a:t>nulla</a:t>
-            </a:r>
-            <a:r>
-              <a:rPr lang="en-US" sz="3000" dirty="0"/>
-              <a:t>.  </a:t>
-            </a:r>
+              <a:rPr lang="en-US" sz="3000" dirty="0"/>
+              <a:t>The obstacle avoidance system ensures that our rover is not impeded on its way to the destination. Taking in filtered images from the obstacle detection software, this system does edge detection on the image find objects in the rovers path, and then decides how to best get around the object. This is done by treating the filtered black and white image as a matrix of pixels, and summing the number of edges to the left, right or in front of the rover and adjusting the direction of the rover to travel where the fewest edges </a:t>
+            </a:r>
+            <a:r>
+              <a:rPr lang="en-US" sz="3000"/>
+              <a:t>are found.</a:t>
+            </a:r>
+            <a:endParaRPr lang="en-US" sz="3000" dirty="0"/>
           </a:p>
           <a:p>
             <a:pPr>
@@ -4616,7 +4249,7 @@
                   <a:srgbClr val="5D87A1"/>
                 </a:solidFill>
               </a:rPr>
-              <a:t>Obstacle Detection Software</a:t>
+              <a:t>Imaging Software</a:t>
             </a:r>
           </a:p>
           <a:p>

</xml_diff>

<commit_message>
added sponsor info to poster
</commit_message>
<xml_diff>
--- a/docs/Poster/postertemplate.pptx
+++ b/docs/Poster/postertemplate.pptx
@@ -4076,7 +4076,7 @@
                   <a:srgbClr val="F37321"/>
                 </a:solidFill>
               </a:rPr>
-              <a:t>A collaborative international effort to build and test prototype satellites</a:t>
+              <a:t>An international effort to build and test prototype satellites</a:t>
             </a:r>
           </a:p>
         </p:txBody>
@@ -4249,7 +4249,7 @@
                   <a:srgbClr val="5D87A1"/>
                 </a:solidFill>
               </a:rPr>
-              <a:t>Imaging Software</a:t>
+              <a:t>Imaging</a:t>
             </a:r>
           </a:p>
           <a:p>
@@ -5539,7 +5539,7 @@
                   <a:srgbClr val="F37321"/>
                 </a:solidFill>
               </a:rPr>
-              <a:t>Title Subhead. Through the eyes of an elite engineer.</a:t>
+              <a:t>What it is and how we did it</a:t>
             </a:r>
           </a:p>
         </p:txBody>
@@ -5903,7 +5903,7 @@
               </a:spcAft>
             </a:pPr>
             <a:r>
-              <a:rPr lang="en-US" sz="3200" b="1" dirty="0">
+              <a:rPr lang="en-US" sz="3600" b="1" dirty="0">
                 <a:solidFill>
                   <a:srgbClr val="F37321"/>
                 </a:solidFill>
@@ -5952,6 +5952,14 @@
                 <a:spcPts val="1800"/>
               </a:spcAft>
             </a:pPr>
+            <a:r>
+              <a:rPr lang="en-US" sz="3000" dirty="0">
+                <a:solidFill>
+                  <a:schemeClr val="bg1"/>
+                </a:solidFill>
+              </a:rPr>
+              <a:t>squires@engr.orst.edu</a:t>
+            </a:r>
             <a:endParaRPr lang="en-US" sz="3000" dirty="0">
               <a:solidFill>
                 <a:schemeClr val="bg1"/>
@@ -5965,945 +5973,28 @@
               </a:spcAft>
             </a:pPr>
             <a:r>
-              <a:rPr lang="en-US" sz="3000" dirty="0" err="1">
+              <a:rPr lang="en-US" sz="3600" b="1" dirty="0">
                 <a:solidFill>
-                  <a:schemeClr val="bg1"/>
+                  <a:srgbClr val="F37321"/>
                 </a:solidFill>
               </a:rPr>
-              <a:t>Lorem</a:t>
-            </a:r>
+              <a:t>Sponsorship</a:t>
+            </a:r>
+          </a:p>
+          <a:p>
+            <a:pPr>
+              <a:spcAft>
+                <a:spcPts val="1800"/>
+              </a:spcAft>
+            </a:pPr>
             <a:r>
               <a:rPr lang="en-US" sz="3000" dirty="0">
                 <a:solidFill>
                   <a:schemeClr val="bg1"/>
                 </a:solidFill>
               </a:rPr>
-              <a:t> </a:t>
-            </a:r>
-            <a:r>
-              <a:rPr lang="en-US" sz="3000" dirty="0" err="1">
-                <a:solidFill>
-                  <a:schemeClr val="bg1"/>
-                </a:solidFill>
-              </a:rPr>
-              <a:t>ipsum</a:t>
-            </a:r>
-            <a:r>
-              <a:rPr lang="en-US" sz="3000" dirty="0">
-                <a:solidFill>
-                  <a:schemeClr val="bg1"/>
-                </a:solidFill>
-              </a:rPr>
-              <a:t> dolor sit </a:t>
-            </a:r>
-            <a:r>
-              <a:rPr lang="en-US" sz="3000" dirty="0" err="1">
-                <a:solidFill>
-                  <a:schemeClr val="bg1"/>
-                </a:solidFill>
-              </a:rPr>
-              <a:t>amet</a:t>
-            </a:r>
-            <a:r>
-              <a:rPr lang="en-US" sz="3000" dirty="0">
-                <a:solidFill>
-                  <a:schemeClr val="bg1"/>
-                </a:solidFill>
-              </a:rPr>
-              <a:t>, </a:t>
-            </a:r>
-            <a:r>
-              <a:rPr lang="en-US" sz="3000" dirty="0" err="1">
-                <a:solidFill>
-                  <a:schemeClr val="bg1"/>
-                </a:solidFill>
-              </a:rPr>
-              <a:t>consectetur</a:t>
-            </a:r>
-            <a:r>
-              <a:rPr lang="en-US" sz="3000" dirty="0">
-                <a:solidFill>
-                  <a:schemeClr val="bg1"/>
-                </a:solidFill>
-              </a:rPr>
-              <a:t> </a:t>
-            </a:r>
-            <a:r>
-              <a:rPr lang="en-US" sz="3000" dirty="0" err="1">
-                <a:solidFill>
-                  <a:schemeClr val="bg1"/>
-                </a:solidFill>
-              </a:rPr>
-              <a:t>adipiscing</a:t>
-            </a:r>
-            <a:r>
-              <a:rPr lang="en-US" sz="3000" dirty="0">
-                <a:solidFill>
-                  <a:schemeClr val="bg1"/>
-                </a:solidFill>
-              </a:rPr>
-              <a:t> </a:t>
-            </a:r>
-            <a:r>
-              <a:rPr lang="en-US" sz="3000" dirty="0" err="1">
-                <a:solidFill>
-                  <a:schemeClr val="bg1"/>
-                </a:solidFill>
-              </a:rPr>
-              <a:t>elit</a:t>
-            </a:r>
-            <a:r>
-              <a:rPr lang="en-US" sz="3000" dirty="0">
-                <a:solidFill>
-                  <a:schemeClr val="bg1"/>
-                </a:solidFill>
-              </a:rPr>
-              <a:t>. </a:t>
-            </a:r>
-            <a:r>
-              <a:rPr lang="en-US" sz="3000" dirty="0" err="1">
-                <a:solidFill>
-                  <a:schemeClr val="bg1"/>
-                </a:solidFill>
-              </a:rPr>
-              <a:t>Nulla</a:t>
-            </a:r>
-            <a:r>
-              <a:rPr lang="en-US" sz="3000" dirty="0">
-                <a:solidFill>
-                  <a:schemeClr val="bg1"/>
-                </a:solidFill>
-              </a:rPr>
-              <a:t> </a:t>
-            </a:r>
-            <a:r>
-              <a:rPr lang="en-US" sz="3000" dirty="0" err="1">
-                <a:solidFill>
-                  <a:schemeClr val="bg1"/>
-                </a:solidFill>
-              </a:rPr>
-              <a:t>facilisi</a:t>
-            </a:r>
-            <a:r>
-              <a:rPr lang="en-US" sz="3000" dirty="0">
-                <a:solidFill>
-                  <a:schemeClr val="bg1"/>
-                </a:solidFill>
-              </a:rPr>
-              <a:t>. Maecenas </a:t>
-            </a:r>
-            <a:r>
-              <a:rPr lang="en-US" sz="3000" dirty="0" err="1">
-                <a:solidFill>
-                  <a:schemeClr val="bg1"/>
-                </a:solidFill>
-              </a:rPr>
-              <a:t>feugiat</a:t>
-            </a:r>
-            <a:r>
-              <a:rPr lang="en-US" sz="3000" dirty="0">
-                <a:solidFill>
-                  <a:schemeClr val="bg1"/>
-                </a:solidFill>
-              </a:rPr>
-              <a:t> </a:t>
-            </a:r>
-            <a:r>
-              <a:rPr lang="en-US" sz="3000" dirty="0" err="1">
-                <a:solidFill>
-                  <a:schemeClr val="bg1"/>
-                </a:solidFill>
-              </a:rPr>
-              <a:t>bibendum</a:t>
-            </a:r>
-            <a:r>
-              <a:rPr lang="en-US" sz="3000" dirty="0">
-                <a:solidFill>
-                  <a:schemeClr val="bg1"/>
-                </a:solidFill>
-              </a:rPr>
-              <a:t> </a:t>
-            </a:r>
-            <a:r>
-              <a:rPr lang="en-US" sz="3000" dirty="0" err="1">
-                <a:solidFill>
-                  <a:schemeClr val="bg1"/>
-                </a:solidFill>
-              </a:rPr>
-              <a:t>convallis</a:t>
-            </a:r>
-            <a:r>
-              <a:rPr lang="en-US" sz="3000" dirty="0">
-                <a:solidFill>
-                  <a:schemeClr val="bg1"/>
-                </a:solidFill>
-              </a:rPr>
-              <a:t>. </a:t>
-            </a:r>
-            <a:r>
-              <a:rPr lang="en-US" sz="3000" dirty="0" err="1">
-                <a:solidFill>
-                  <a:schemeClr val="bg1"/>
-                </a:solidFill>
-              </a:rPr>
-              <a:t>Praesent</a:t>
-            </a:r>
-            <a:r>
-              <a:rPr lang="en-US" sz="3000" dirty="0">
-                <a:solidFill>
-                  <a:schemeClr val="bg1"/>
-                </a:solidFill>
-              </a:rPr>
-              <a:t> et dui </a:t>
-            </a:r>
-            <a:r>
-              <a:rPr lang="en-US" sz="3000" dirty="0" err="1">
-                <a:solidFill>
-                  <a:schemeClr val="bg1"/>
-                </a:solidFill>
-              </a:rPr>
-              <a:t>mauris</a:t>
-            </a:r>
-            <a:r>
-              <a:rPr lang="en-US" sz="3000" dirty="0">
-                <a:solidFill>
-                  <a:schemeClr val="bg1"/>
-                </a:solidFill>
-              </a:rPr>
-              <a:t>, </a:t>
-            </a:r>
-            <a:r>
-              <a:rPr lang="en-US" sz="3000" dirty="0" err="1">
-                <a:solidFill>
-                  <a:schemeClr val="bg1"/>
-                </a:solidFill>
-              </a:rPr>
-              <a:t>ullamcorper</a:t>
-            </a:r>
-            <a:r>
-              <a:rPr lang="en-US" sz="3000" dirty="0">
-                <a:solidFill>
-                  <a:schemeClr val="bg1"/>
-                </a:solidFill>
-              </a:rPr>
-              <a:t> semper </a:t>
-            </a:r>
-            <a:r>
-              <a:rPr lang="en-US" sz="3000" dirty="0" err="1">
-                <a:solidFill>
-                  <a:schemeClr val="bg1"/>
-                </a:solidFill>
-              </a:rPr>
-              <a:t>justo</a:t>
-            </a:r>
-            <a:r>
-              <a:rPr lang="en-US" sz="3000" dirty="0">
-                <a:solidFill>
-                  <a:schemeClr val="bg1"/>
-                </a:solidFill>
-              </a:rPr>
-              <a:t>. </a:t>
-            </a:r>
-            <a:r>
-              <a:rPr lang="en-US" sz="3000" dirty="0" err="1">
-                <a:solidFill>
-                  <a:schemeClr val="bg1"/>
-                </a:solidFill>
-              </a:rPr>
-              <a:t>Curabitur</a:t>
-            </a:r>
-            <a:r>
-              <a:rPr lang="en-US" sz="3000" dirty="0">
-                <a:solidFill>
-                  <a:schemeClr val="bg1"/>
-                </a:solidFill>
-              </a:rPr>
-              <a:t> sit </a:t>
-            </a:r>
-            <a:r>
-              <a:rPr lang="en-US" sz="3000" dirty="0" err="1">
-                <a:solidFill>
-                  <a:schemeClr val="bg1"/>
-                </a:solidFill>
-              </a:rPr>
-              <a:t>amet</a:t>
-            </a:r>
-            <a:r>
-              <a:rPr lang="en-US" sz="3000" dirty="0">
-                <a:solidFill>
-                  <a:schemeClr val="bg1"/>
-                </a:solidFill>
-              </a:rPr>
-              <a:t> </a:t>
-            </a:r>
-            <a:r>
-              <a:rPr lang="en-US" sz="3000" dirty="0" err="1">
-                <a:solidFill>
-                  <a:schemeClr val="bg1"/>
-                </a:solidFill>
-              </a:rPr>
-              <a:t>orci</a:t>
-            </a:r>
-            <a:r>
-              <a:rPr lang="en-US" sz="3000" dirty="0">
-                <a:solidFill>
-                  <a:schemeClr val="bg1"/>
-                </a:solidFill>
-              </a:rPr>
-              <a:t> non magna </a:t>
-            </a:r>
-            <a:r>
-              <a:rPr lang="en-US" sz="3000" dirty="0" err="1">
-                <a:solidFill>
-                  <a:schemeClr val="bg1"/>
-                </a:solidFill>
-              </a:rPr>
-              <a:t>mattis</a:t>
-            </a:r>
-            <a:r>
-              <a:rPr lang="en-US" sz="3000" dirty="0">
-                <a:solidFill>
-                  <a:schemeClr val="bg1"/>
-                </a:solidFill>
-              </a:rPr>
-              <a:t> </a:t>
-            </a:r>
-            <a:r>
-              <a:rPr lang="en-US" sz="3000" dirty="0" err="1">
-                <a:solidFill>
-                  <a:schemeClr val="bg1"/>
-                </a:solidFill>
-              </a:rPr>
-              <a:t>accumsan</a:t>
-            </a:r>
-            <a:r>
-              <a:rPr lang="en-US" sz="3000" dirty="0">
-                <a:solidFill>
-                  <a:schemeClr val="bg1"/>
-                </a:solidFill>
-              </a:rPr>
-              <a:t> </a:t>
-            </a:r>
-            <a:r>
-              <a:rPr lang="en-US" sz="3000" dirty="0" err="1">
-                <a:solidFill>
-                  <a:schemeClr val="bg1"/>
-                </a:solidFill>
-              </a:rPr>
-              <a:t>quis</a:t>
-            </a:r>
-            <a:r>
-              <a:rPr lang="en-US" sz="3000" dirty="0">
-                <a:solidFill>
-                  <a:schemeClr val="bg1"/>
-                </a:solidFill>
-              </a:rPr>
-              <a:t> </a:t>
-            </a:r>
-            <a:r>
-              <a:rPr lang="en-US" sz="3000" dirty="0" err="1">
-                <a:solidFill>
-                  <a:schemeClr val="bg1"/>
-                </a:solidFill>
-              </a:rPr>
-              <a:t>vel</a:t>
-            </a:r>
-            <a:r>
-              <a:rPr lang="en-US" sz="3000" dirty="0">
-                <a:solidFill>
-                  <a:schemeClr val="bg1"/>
-                </a:solidFill>
-              </a:rPr>
-              <a:t> sem. </a:t>
-            </a:r>
-            <a:r>
-              <a:rPr lang="en-US" sz="3000" dirty="0" err="1">
-                <a:solidFill>
-                  <a:schemeClr val="bg1"/>
-                </a:solidFill>
-              </a:rPr>
-              <a:t>Duis</a:t>
-            </a:r>
-            <a:r>
-              <a:rPr lang="en-US" sz="3000" dirty="0">
-                <a:solidFill>
-                  <a:schemeClr val="bg1"/>
-                </a:solidFill>
-              </a:rPr>
-              <a:t> </a:t>
-            </a:r>
-            <a:r>
-              <a:rPr lang="en-US" sz="3000" dirty="0" err="1">
-                <a:solidFill>
-                  <a:schemeClr val="bg1"/>
-                </a:solidFill>
-              </a:rPr>
-              <a:t>leo</a:t>
-            </a:r>
-            <a:r>
-              <a:rPr lang="en-US" sz="3000" dirty="0">
-                <a:solidFill>
-                  <a:schemeClr val="bg1"/>
-                </a:solidFill>
-              </a:rPr>
-              <a:t> </a:t>
-            </a:r>
-            <a:r>
-              <a:rPr lang="en-US" sz="3000" dirty="0" err="1">
-                <a:solidFill>
-                  <a:schemeClr val="bg1"/>
-                </a:solidFill>
-              </a:rPr>
-              <a:t>massa</a:t>
-            </a:r>
-            <a:r>
-              <a:rPr lang="en-US" sz="3000" dirty="0">
-                <a:solidFill>
-                  <a:schemeClr val="bg1"/>
-                </a:solidFill>
-              </a:rPr>
-              <a:t>, </a:t>
-            </a:r>
-            <a:r>
-              <a:rPr lang="en-US" sz="3000" dirty="0" err="1">
-                <a:solidFill>
-                  <a:schemeClr val="bg1"/>
-                </a:solidFill>
-              </a:rPr>
-              <a:t>tristique</a:t>
-            </a:r>
-            <a:r>
-              <a:rPr lang="en-US" sz="3000" dirty="0">
-                <a:solidFill>
-                  <a:schemeClr val="bg1"/>
-                </a:solidFill>
-              </a:rPr>
-              <a:t> a </a:t>
-            </a:r>
-            <a:r>
-              <a:rPr lang="en-US" sz="3000" dirty="0" err="1">
-                <a:solidFill>
-                  <a:schemeClr val="bg1"/>
-                </a:solidFill>
-              </a:rPr>
-              <a:t>porttitor</a:t>
-            </a:r>
-            <a:r>
-              <a:rPr lang="en-US" sz="3000" dirty="0">
-                <a:solidFill>
-                  <a:schemeClr val="bg1"/>
-                </a:solidFill>
-              </a:rPr>
-              <a:t> id, </a:t>
-            </a:r>
-            <a:r>
-              <a:rPr lang="en-US" sz="3000" dirty="0" err="1">
-                <a:solidFill>
-                  <a:schemeClr val="bg1"/>
-                </a:solidFill>
-              </a:rPr>
-              <a:t>mattis</a:t>
-            </a:r>
-            <a:r>
-              <a:rPr lang="en-US" sz="3000" dirty="0">
-                <a:solidFill>
-                  <a:schemeClr val="bg1"/>
-                </a:solidFill>
-              </a:rPr>
-              <a:t> in </a:t>
-            </a:r>
-            <a:r>
-              <a:rPr lang="en-US" sz="3000" dirty="0" err="1">
-                <a:solidFill>
-                  <a:schemeClr val="bg1"/>
-                </a:solidFill>
-              </a:rPr>
-              <a:t>velit</a:t>
-            </a:r>
-            <a:r>
-              <a:rPr lang="en-US" sz="3000" dirty="0">
-                <a:solidFill>
-                  <a:schemeClr val="bg1"/>
-                </a:solidFill>
-              </a:rPr>
-              <a:t>. </a:t>
-            </a:r>
-            <a:r>
-              <a:rPr lang="en-US" sz="3000" dirty="0" err="1">
-                <a:solidFill>
-                  <a:schemeClr val="bg1"/>
-                </a:solidFill>
-              </a:rPr>
-              <a:t>Aliquam</a:t>
-            </a:r>
-            <a:r>
-              <a:rPr lang="en-US" sz="3000" dirty="0">
-                <a:solidFill>
-                  <a:schemeClr val="bg1"/>
-                </a:solidFill>
-              </a:rPr>
-              <a:t> </a:t>
-            </a:r>
-            <a:r>
-              <a:rPr lang="en-US" sz="3000" dirty="0" err="1">
-                <a:solidFill>
-                  <a:schemeClr val="bg1"/>
-                </a:solidFill>
-              </a:rPr>
-              <a:t>vel</a:t>
-            </a:r>
-            <a:r>
-              <a:rPr lang="en-US" sz="3000" dirty="0">
-                <a:solidFill>
-                  <a:schemeClr val="bg1"/>
-                </a:solidFill>
-              </a:rPr>
-              <a:t> </a:t>
-            </a:r>
-            <a:r>
-              <a:rPr lang="en-US" sz="3000" dirty="0" err="1">
-                <a:solidFill>
-                  <a:schemeClr val="bg1"/>
-                </a:solidFill>
-              </a:rPr>
-              <a:t>tortor</a:t>
-            </a:r>
-            <a:r>
-              <a:rPr lang="en-US" sz="3000" dirty="0">
-                <a:solidFill>
-                  <a:schemeClr val="bg1"/>
-                </a:solidFill>
-              </a:rPr>
-              <a:t> quam, ac </a:t>
-            </a:r>
-            <a:r>
-              <a:rPr lang="en-US" sz="3000" dirty="0" err="1">
-                <a:solidFill>
-                  <a:schemeClr val="bg1"/>
-                </a:solidFill>
-              </a:rPr>
-              <a:t>porttitor</a:t>
-            </a:r>
-            <a:r>
-              <a:rPr lang="en-US" sz="3000" dirty="0">
-                <a:solidFill>
-                  <a:schemeClr val="bg1"/>
-                </a:solidFill>
-              </a:rPr>
-              <a:t> </a:t>
-            </a:r>
-            <a:r>
-              <a:rPr lang="en-US" sz="3000" dirty="0" err="1">
-                <a:solidFill>
-                  <a:schemeClr val="bg1"/>
-                </a:solidFill>
-              </a:rPr>
-              <a:t>metus</a:t>
-            </a:r>
-            <a:r>
-              <a:rPr lang="en-US" sz="3000" dirty="0">
-                <a:solidFill>
-                  <a:schemeClr val="bg1"/>
-                </a:solidFill>
-              </a:rPr>
-              <a:t>. </a:t>
-            </a:r>
-            <a:r>
-              <a:rPr lang="en-US" sz="3000" dirty="0" err="1">
-                <a:solidFill>
-                  <a:schemeClr val="bg1"/>
-                </a:solidFill>
-              </a:rPr>
-              <a:t>Suspendisse</a:t>
-            </a:r>
-            <a:r>
-              <a:rPr lang="en-US" sz="3000" dirty="0">
-                <a:solidFill>
-                  <a:schemeClr val="bg1"/>
-                </a:solidFill>
-              </a:rPr>
-              <a:t> et dui diam. </a:t>
-            </a:r>
-            <a:r>
-              <a:rPr lang="en-US" sz="3000" dirty="0" err="1">
-                <a:solidFill>
-                  <a:schemeClr val="bg1"/>
-                </a:solidFill>
-              </a:rPr>
-              <a:t>Quisque</a:t>
-            </a:r>
-            <a:r>
-              <a:rPr lang="en-US" sz="3000" dirty="0">
-                <a:solidFill>
-                  <a:schemeClr val="bg1"/>
-                </a:solidFill>
-              </a:rPr>
-              <a:t> </a:t>
-            </a:r>
-            <a:r>
-              <a:rPr lang="en-US" sz="3000" dirty="0" err="1">
-                <a:solidFill>
-                  <a:schemeClr val="bg1"/>
-                </a:solidFill>
-              </a:rPr>
-              <a:t>posuere</a:t>
-            </a:r>
-            <a:r>
-              <a:rPr lang="en-US" sz="3000" dirty="0">
-                <a:solidFill>
-                  <a:schemeClr val="bg1"/>
-                </a:solidFill>
-              </a:rPr>
-              <a:t> </a:t>
-            </a:r>
-            <a:r>
-              <a:rPr lang="en-US" sz="3000" dirty="0" err="1">
-                <a:solidFill>
-                  <a:schemeClr val="bg1"/>
-                </a:solidFill>
-              </a:rPr>
-              <a:t>diam</a:t>
-            </a:r>
-            <a:r>
-              <a:rPr lang="en-US" sz="3000" dirty="0">
-                <a:solidFill>
-                  <a:schemeClr val="bg1"/>
-                </a:solidFill>
-              </a:rPr>
-              <a:t> </a:t>
-            </a:r>
-            <a:r>
-              <a:rPr lang="en-US" sz="3000" dirty="0" err="1">
-                <a:solidFill>
-                  <a:schemeClr val="bg1"/>
-                </a:solidFill>
-              </a:rPr>
-              <a:t>hendrerit</a:t>
-            </a:r>
-            <a:r>
-              <a:rPr lang="en-US" sz="3000" dirty="0">
-                <a:solidFill>
-                  <a:schemeClr val="bg1"/>
-                </a:solidFill>
-              </a:rPr>
-              <a:t> </a:t>
-            </a:r>
-            <a:r>
-              <a:rPr lang="en-US" sz="3000" dirty="0" err="1">
-                <a:solidFill>
-                  <a:schemeClr val="bg1"/>
-                </a:solidFill>
-              </a:rPr>
-              <a:t>ipsum</a:t>
-            </a:r>
-            <a:r>
-              <a:rPr lang="en-US" sz="3000" dirty="0">
-                <a:solidFill>
-                  <a:schemeClr val="bg1"/>
-                </a:solidFill>
-              </a:rPr>
-              <a:t> </a:t>
-            </a:r>
-            <a:r>
-              <a:rPr lang="en-US" sz="3000" dirty="0" err="1">
-                <a:solidFill>
-                  <a:schemeClr val="bg1"/>
-                </a:solidFill>
-              </a:rPr>
-              <a:t>condimentum</a:t>
-            </a:r>
-            <a:r>
-              <a:rPr lang="en-US" sz="3000" dirty="0">
-                <a:solidFill>
-                  <a:schemeClr val="bg1"/>
-                </a:solidFill>
-              </a:rPr>
-              <a:t> </a:t>
-            </a:r>
-            <a:r>
-              <a:rPr lang="en-US" sz="3000" dirty="0" err="1">
-                <a:solidFill>
-                  <a:schemeClr val="bg1"/>
-                </a:solidFill>
-              </a:rPr>
-              <a:t>nec</a:t>
-            </a:r>
-            <a:r>
-              <a:rPr lang="en-US" sz="3000" dirty="0">
-                <a:solidFill>
-                  <a:schemeClr val="bg1"/>
-                </a:solidFill>
-              </a:rPr>
-              <a:t> </a:t>
-            </a:r>
-            <a:r>
-              <a:rPr lang="en-US" sz="3000" dirty="0" err="1">
-                <a:solidFill>
-                  <a:schemeClr val="bg1"/>
-                </a:solidFill>
-              </a:rPr>
-              <a:t>convallis</a:t>
-            </a:r>
-            <a:r>
-              <a:rPr lang="en-US" sz="3000" dirty="0">
-                <a:solidFill>
-                  <a:schemeClr val="bg1"/>
-                </a:solidFill>
-              </a:rPr>
-              <a:t> </a:t>
-            </a:r>
-            <a:r>
-              <a:rPr lang="en-US" sz="3000" dirty="0" err="1">
-                <a:solidFill>
-                  <a:schemeClr val="bg1"/>
-                </a:solidFill>
-              </a:rPr>
-              <a:t>massa</a:t>
-            </a:r>
-            <a:r>
-              <a:rPr lang="en-US" sz="3000" dirty="0">
-                <a:solidFill>
-                  <a:schemeClr val="bg1"/>
-                </a:solidFill>
-              </a:rPr>
-              <a:t> </a:t>
-            </a:r>
-            <a:r>
-              <a:rPr lang="en-US" sz="3000" dirty="0" err="1">
-                <a:solidFill>
-                  <a:schemeClr val="bg1"/>
-                </a:solidFill>
-              </a:rPr>
-              <a:t>congue</a:t>
-            </a:r>
-            <a:r>
-              <a:rPr lang="en-US" sz="3000" dirty="0">
-                <a:solidFill>
-                  <a:schemeClr val="bg1"/>
-                </a:solidFill>
-              </a:rPr>
-              <a:t>. Integer </a:t>
-            </a:r>
-            <a:r>
-              <a:rPr lang="en-US" sz="3000" dirty="0" err="1">
-                <a:solidFill>
-                  <a:schemeClr val="bg1"/>
-                </a:solidFill>
-              </a:rPr>
-              <a:t>nec</a:t>
-            </a:r>
-            <a:r>
-              <a:rPr lang="en-US" sz="3000" dirty="0">
-                <a:solidFill>
-                  <a:schemeClr val="bg1"/>
-                </a:solidFill>
-              </a:rPr>
-              <a:t> </a:t>
-            </a:r>
-            <a:r>
-              <a:rPr lang="en-US" sz="3000" dirty="0" err="1">
-                <a:solidFill>
-                  <a:schemeClr val="bg1"/>
-                </a:solidFill>
-              </a:rPr>
-              <a:t>velit</a:t>
-            </a:r>
-            <a:r>
-              <a:rPr lang="en-US" sz="3000" dirty="0">
-                <a:solidFill>
-                  <a:schemeClr val="bg1"/>
-                </a:solidFill>
-              </a:rPr>
-              <a:t> </a:t>
-            </a:r>
-            <a:r>
-              <a:rPr lang="en-US" sz="3000" dirty="0" err="1">
-                <a:solidFill>
-                  <a:schemeClr val="bg1"/>
-                </a:solidFill>
-              </a:rPr>
-              <a:t>quis</a:t>
-            </a:r>
-            <a:r>
-              <a:rPr lang="en-US" sz="3000" dirty="0">
-                <a:solidFill>
-                  <a:schemeClr val="bg1"/>
-                </a:solidFill>
-              </a:rPr>
-              <a:t> </a:t>
-            </a:r>
-            <a:r>
-              <a:rPr lang="en-US" sz="3000" dirty="0" err="1">
-                <a:solidFill>
-                  <a:schemeClr val="bg1"/>
-                </a:solidFill>
-              </a:rPr>
-              <a:t>nunc</a:t>
-            </a:r>
-            <a:r>
-              <a:rPr lang="en-US" sz="3000" dirty="0">
-                <a:solidFill>
-                  <a:schemeClr val="bg1"/>
-                </a:solidFill>
-              </a:rPr>
-              <a:t> </a:t>
-            </a:r>
-            <a:r>
-              <a:rPr lang="en-US" sz="3000" dirty="0" err="1">
-                <a:solidFill>
-                  <a:schemeClr val="bg1"/>
-                </a:solidFill>
-              </a:rPr>
-              <a:t>scelerisque</a:t>
-            </a:r>
-            <a:r>
-              <a:rPr lang="en-US" sz="3000" dirty="0">
-                <a:solidFill>
-                  <a:schemeClr val="bg1"/>
-                </a:solidFill>
-              </a:rPr>
-              <a:t> </a:t>
-            </a:r>
-            <a:r>
-              <a:rPr lang="en-US" sz="3000" dirty="0" err="1">
-                <a:solidFill>
-                  <a:schemeClr val="bg1"/>
-                </a:solidFill>
-              </a:rPr>
-              <a:t>eleifend</a:t>
-            </a:r>
-            <a:r>
-              <a:rPr lang="en-US" sz="3000" dirty="0">
-                <a:solidFill>
-                  <a:schemeClr val="bg1"/>
-                </a:solidFill>
-              </a:rPr>
-              <a:t>. </a:t>
-            </a:r>
-            <a:r>
-              <a:rPr lang="en-US" sz="3000" dirty="0" err="1">
-                <a:solidFill>
-                  <a:schemeClr val="bg1"/>
-                </a:solidFill>
-              </a:rPr>
-              <a:t>Suspendisse</a:t>
-            </a:r>
-            <a:r>
-              <a:rPr lang="en-US" sz="3000" dirty="0">
-                <a:solidFill>
-                  <a:schemeClr val="bg1"/>
-                </a:solidFill>
-              </a:rPr>
-              <a:t> </a:t>
-            </a:r>
-            <a:r>
-              <a:rPr lang="en-US" sz="3000" dirty="0" err="1">
-                <a:solidFill>
-                  <a:schemeClr val="bg1"/>
-                </a:solidFill>
-              </a:rPr>
-              <a:t>potenti</a:t>
-            </a:r>
-            <a:r>
-              <a:rPr lang="en-US" sz="3000" dirty="0">
-                <a:solidFill>
-                  <a:schemeClr val="bg1"/>
-                </a:solidFill>
-              </a:rPr>
-              <a:t>. Integer </a:t>
-            </a:r>
-            <a:r>
-              <a:rPr lang="en-US" sz="3000" dirty="0" err="1">
-                <a:solidFill>
-                  <a:schemeClr val="bg1"/>
-                </a:solidFill>
-              </a:rPr>
-              <a:t>rutrum</a:t>
-            </a:r>
-            <a:r>
-              <a:rPr lang="en-US" sz="3000" dirty="0">
-                <a:solidFill>
-                  <a:schemeClr val="bg1"/>
-                </a:solidFill>
-              </a:rPr>
-              <a:t> </a:t>
-            </a:r>
-            <a:r>
-              <a:rPr lang="en-US" sz="3000" dirty="0" err="1">
-                <a:solidFill>
-                  <a:schemeClr val="bg1"/>
-                </a:solidFill>
-              </a:rPr>
-              <a:t>faucibus</a:t>
-            </a:r>
-            <a:r>
-              <a:rPr lang="en-US" sz="3000" dirty="0">
-                <a:solidFill>
-                  <a:schemeClr val="bg1"/>
-                </a:solidFill>
-              </a:rPr>
-              <a:t> </a:t>
-            </a:r>
-            <a:r>
-              <a:rPr lang="en-US" sz="3000" dirty="0" err="1">
-                <a:solidFill>
-                  <a:schemeClr val="bg1"/>
-                </a:solidFill>
-              </a:rPr>
-              <a:t>justo</a:t>
-            </a:r>
-            <a:r>
-              <a:rPr lang="en-US" sz="3000" dirty="0">
-                <a:solidFill>
-                  <a:schemeClr val="bg1"/>
-                </a:solidFill>
-              </a:rPr>
-              <a:t>, a semper </a:t>
-            </a:r>
-            <a:r>
-              <a:rPr lang="en-US" sz="3000" dirty="0" err="1">
-                <a:solidFill>
-                  <a:schemeClr val="bg1"/>
-                </a:solidFill>
-              </a:rPr>
-              <a:t>lectus</a:t>
-            </a:r>
-            <a:r>
-              <a:rPr lang="en-US" sz="3000" dirty="0">
-                <a:solidFill>
-                  <a:schemeClr val="bg1"/>
-                </a:solidFill>
-              </a:rPr>
-              <a:t> </a:t>
-            </a:r>
-            <a:r>
-              <a:rPr lang="en-US" sz="3000" dirty="0" err="1">
-                <a:solidFill>
-                  <a:schemeClr val="bg1"/>
-                </a:solidFill>
-              </a:rPr>
-              <a:t>vulputate</a:t>
-            </a:r>
-            <a:r>
-              <a:rPr lang="en-US" sz="3000" dirty="0">
-                <a:solidFill>
-                  <a:schemeClr val="bg1"/>
-                </a:solidFill>
-              </a:rPr>
-              <a:t> ac. </a:t>
-            </a:r>
-          </a:p>
-          <a:p>
-            <a:pPr>
-              <a:spcAft>
-                <a:spcPts val="1800"/>
-              </a:spcAft>
-            </a:pPr>
-            <a:endParaRPr lang="en-US" sz="3000" dirty="0">
-              <a:solidFill>
-                <a:schemeClr val="bg1"/>
-              </a:solidFill>
-            </a:endParaRPr>
+              <a:t>This project was made possible through funding provided by Oregon State University AIAA</a:t>
+            </a:r>
           </a:p>
         </p:txBody>
       </p:sp>

</xml_diff>